<commit_message>
The main.go file was modified.
</commit_message>
<xml_diff>
--- a/doc/Estructura REST.pptx
+++ b/doc/Estructura REST.pptx
@@ -243,7 +243,7 @@
           <a:p>
             <a:fld id="{A63DF546-874D-4130-8EE0-14A9E1B6B679}" type="datetimeFigureOut">
               <a:rPr lang="en-US" smtClean="0"/>
-              <a:t>4/25/2023</a:t>
+              <a:t>4/29/2023</a:t>
             </a:fld>
             <a:endParaRPr lang="en-US"/>
           </a:p>
@@ -413,7 +413,7 @@
           <a:p>
             <a:fld id="{A63DF546-874D-4130-8EE0-14A9E1B6B679}" type="datetimeFigureOut">
               <a:rPr lang="en-US" smtClean="0"/>
-              <a:t>4/25/2023</a:t>
+              <a:t>4/29/2023</a:t>
             </a:fld>
             <a:endParaRPr lang="en-US"/>
           </a:p>
@@ -593,7 +593,7 @@
           <a:p>
             <a:fld id="{A63DF546-874D-4130-8EE0-14A9E1B6B679}" type="datetimeFigureOut">
               <a:rPr lang="en-US" smtClean="0"/>
-              <a:t>4/25/2023</a:t>
+              <a:t>4/29/2023</a:t>
             </a:fld>
             <a:endParaRPr lang="en-US"/>
           </a:p>
@@ -763,7 +763,7 @@
           <a:p>
             <a:fld id="{A63DF546-874D-4130-8EE0-14A9E1B6B679}" type="datetimeFigureOut">
               <a:rPr lang="en-US" smtClean="0"/>
-              <a:t>4/25/2023</a:t>
+              <a:t>4/29/2023</a:t>
             </a:fld>
             <a:endParaRPr lang="en-US"/>
           </a:p>
@@ -1009,7 +1009,7 @@
           <a:p>
             <a:fld id="{A63DF546-874D-4130-8EE0-14A9E1B6B679}" type="datetimeFigureOut">
               <a:rPr lang="en-US" smtClean="0"/>
-              <a:t>4/25/2023</a:t>
+              <a:t>4/29/2023</a:t>
             </a:fld>
             <a:endParaRPr lang="en-US"/>
           </a:p>
@@ -1241,7 +1241,7 @@
           <a:p>
             <a:fld id="{A63DF546-874D-4130-8EE0-14A9E1B6B679}" type="datetimeFigureOut">
               <a:rPr lang="en-US" smtClean="0"/>
-              <a:t>4/25/2023</a:t>
+              <a:t>4/29/2023</a:t>
             </a:fld>
             <a:endParaRPr lang="en-US"/>
           </a:p>
@@ -1608,7 +1608,7 @@
           <a:p>
             <a:fld id="{A63DF546-874D-4130-8EE0-14A9E1B6B679}" type="datetimeFigureOut">
               <a:rPr lang="en-US" smtClean="0"/>
-              <a:t>4/25/2023</a:t>
+              <a:t>4/29/2023</a:t>
             </a:fld>
             <a:endParaRPr lang="en-US"/>
           </a:p>
@@ -1726,7 +1726,7 @@
           <a:p>
             <a:fld id="{A63DF546-874D-4130-8EE0-14A9E1B6B679}" type="datetimeFigureOut">
               <a:rPr lang="en-US" smtClean="0"/>
-              <a:t>4/25/2023</a:t>
+              <a:t>4/29/2023</a:t>
             </a:fld>
             <a:endParaRPr lang="en-US"/>
           </a:p>
@@ -1821,7 +1821,7 @@
           <a:p>
             <a:fld id="{A63DF546-874D-4130-8EE0-14A9E1B6B679}" type="datetimeFigureOut">
               <a:rPr lang="en-US" smtClean="0"/>
-              <a:t>4/25/2023</a:t>
+              <a:t>4/29/2023</a:t>
             </a:fld>
             <a:endParaRPr lang="en-US"/>
           </a:p>
@@ -2098,7 +2098,7 @@
           <a:p>
             <a:fld id="{A63DF546-874D-4130-8EE0-14A9E1B6B679}" type="datetimeFigureOut">
               <a:rPr lang="en-US" smtClean="0"/>
-              <a:t>4/25/2023</a:t>
+              <a:t>4/29/2023</a:t>
             </a:fld>
             <a:endParaRPr lang="en-US"/>
           </a:p>
@@ -2351,7 +2351,7 @@
           <a:p>
             <a:fld id="{A63DF546-874D-4130-8EE0-14A9E1B6B679}" type="datetimeFigureOut">
               <a:rPr lang="en-US" smtClean="0"/>
-              <a:t>4/25/2023</a:t>
+              <a:t>4/29/2023</a:t>
             </a:fld>
             <a:endParaRPr lang="en-US"/>
           </a:p>
@@ -2564,7 +2564,7 @@
           <a:p>
             <a:fld id="{A63DF546-874D-4130-8EE0-14A9E1B6B679}" type="datetimeFigureOut">
               <a:rPr lang="en-US" smtClean="0"/>
-              <a:t>4/25/2023</a:t>
+              <a:t>4/29/2023</a:t>
             </a:fld>
             <a:endParaRPr lang="en-US"/>
           </a:p>
@@ -3315,8 +3315,8 @@
         </p:nvSpPr>
         <p:spPr>
           <a:xfrm>
-            <a:off x="5638690" y="3164071"/>
-            <a:ext cx="1036630" cy="400110"/>
+            <a:off x="4075847" y="3151229"/>
+            <a:ext cx="901208" cy="400110"/>
           </a:xfrm>
           <a:prstGeom prst="rect">
             <a:avLst/>
@@ -3344,7 +3344,7 @@
                   </a:outerShdw>
                 </a:effectLst>
               </a:rPr>
-              <a:t>Services</a:t>
+              <a:t>Routes</a:t>
             </a:r>
             <a:endParaRPr lang="es-ES" sz="2000" b="0" cap="none" spc="0" dirty="0">
               <a:ln w="0"/>
@@ -3425,7 +3425,7 @@
         </p:nvSpPr>
         <p:spPr>
           <a:xfrm>
-            <a:off x="3719584" y="3164071"/>
+            <a:off x="5513007" y="3164071"/>
             <a:ext cx="1327992" cy="400110"/>
           </a:xfrm>
           <a:prstGeom prst="rect">
@@ -3480,7 +3480,7 @@
         </p:nvSpPr>
         <p:spPr>
           <a:xfrm>
-            <a:off x="3608019" y="2828018"/>
+            <a:off x="3515470" y="3191100"/>
             <a:ext cx="565603" cy="336053"/>
           </a:xfrm>
           <a:prstGeom prst="roundRect">
@@ -3549,7 +3549,7 @@
                 <a:ea typeface="Calibri" panose="020F0502020204030204" pitchFamily="34" charset="0"/>
                 <a:cs typeface="Times New Roman" panose="02020603050405020304" pitchFamily="18" charset="0"/>
               </a:rPr>
-              <a:t>DTO</a:t>
+              <a:t>JSON</a:t>
             </a:r>
             <a:endParaRPr lang="en-US" b="1" dirty="0">
               <a:effectLst/>
@@ -3559,133 +3559,6 @@
           </a:p>
         </p:txBody>
       </p:sp>
-      <p:sp>
-        <p:nvSpPr>
-          <p:cNvPr id="27" name="Rectángulo redondeado 26"/>
-          <p:cNvSpPr/>
-          <p:nvPr/>
-        </p:nvSpPr>
-        <p:spPr>
-          <a:xfrm>
-            <a:off x="3608019" y="3566166"/>
-            <a:ext cx="565603" cy="336053"/>
-          </a:xfrm>
-          <a:prstGeom prst="roundRect">
-            <a:avLst/>
-          </a:prstGeom>
-          <a:solidFill>
-            <a:schemeClr val="accent6">
-              <a:lumMod val="75000"/>
-            </a:schemeClr>
-          </a:solidFill>
-          <a:ln>
-            <a:solidFill>
-              <a:schemeClr val="accent6">
-                <a:lumMod val="50000"/>
-              </a:schemeClr>
-            </a:solidFill>
-          </a:ln>
-        </p:spPr>
-        <p:style>
-          <a:lnRef idx="2">
-            <a:schemeClr val="accent1">
-              <a:shade val="50000"/>
-            </a:schemeClr>
-          </a:lnRef>
-          <a:fillRef idx="1">
-            <a:schemeClr val="accent1"/>
-          </a:fillRef>
-          <a:effectRef idx="0">
-            <a:schemeClr val="accent1"/>
-          </a:effectRef>
-          <a:fontRef idx="minor">
-            <a:schemeClr val="lt1"/>
-          </a:fontRef>
-        </p:style>
-        <p:txBody>
-          <a:bodyPr rot="0" spcFirstLastPara="0" vert="horz" wrap="square" lIns="91440" tIns="45720" rIns="91440" bIns="45720" numCol="1" spcCol="0" rtlCol="0" fromWordArt="0" anchor="ctr" anchorCtr="0" forceAA="0" compatLnSpc="1">
-            <a:prstTxWarp prst="textNoShape">
-              <a:avLst/>
-            </a:prstTxWarp>
-            <a:noAutofit/>
-          </a:bodyPr>
-          <a:lstStyle/>
-          <a:p>
-            <a:pPr marL="0" marR="0" algn="ctr">
-              <a:lnSpc>
-                <a:spcPct val="107000"/>
-              </a:lnSpc>
-              <a:spcBef>
-                <a:spcPts val="0"/>
-              </a:spcBef>
-              <a:spcAft>
-                <a:spcPts val="800"/>
-              </a:spcAft>
-            </a:pPr>
-            <a:r>
-              <a:rPr lang="es-AR" sz="1100" b="1" dirty="0">
-                <a:effectLst/>
-                <a:ea typeface="Calibri" panose="020F0502020204030204" pitchFamily="34" charset="0"/>
-                <a:cs typeface="Times New Roman" panose="02020603050405020304" pitchFamily="18" charset="0"/>
-              </a:rPr>
-              <a:t> </a:t>
-            </a:r>
-            <a:r>
-              <a:rPr lang="es-AR" sz="1100" b="1" dirty="0" smtClean="0">
-                <a:effectLst/>
-                <a:ea typeface="Calibri" panose="020F0502020204030204" pitchFamily="34" charset="0"/>
-                <a:cs typeface="Times New Roman" panose="02020603050405020304" pitchFamily="18" charset="0"/>
-              </a:rPr>
-              <a:t>DTO</a:t>
-            </a:r>
-            <a:endParaRPr lang="en-US" b="1" dirty="0">
-              <a:effectLst/>
-              <a:ea typeface="Calibri" panose="020F0502020204030204" pitchFamily="34" charset="0"/>
-              <a:cs typeface="Times New Roman" panose="02020603050405020304" pitchFamily="18" charset="0"/>
-            </a:endParaRPr>
-          </a:p>
-        </p:txBody>
-      </p:sp>
-      <p:cxnSp>
-        <p:nvCxnSpPr>
-          <p:cNvPr id="29" name="Conector recto de flecha 28"/>
-          <p:cNvCxnSpPr>
-            <a:stCxn id="27" idx="1"/>
-          </p:cNvCxnSpPr>
-          <p:nvPr/>
-        </p:nvCxnSpPr>
-        <p:spPr>
-          <a:xfrm flipH="1">
-            <a:off x="3125561" y="3734193"/>
-            <a:ext cx="482458" cy="0"/>
-          </a:xfrm>
-          <a:prstGeom prst="straightConnector1">
-            <a:avLst/>
-          </a:prstGeom>
-          <a:ln w="28575">
-            <a:solidFill>
-              <a:schemeClr val="accent6">
-                <a:lumMod val="50000"/>
-              </a:schemeClr>
-            </a:solidFill>
-            <a:tailEnd type="triangle"/>
-          </a:ln>
-        </p:spPr>
-        <p:style>
-          <a:lnRef idx="1">
-            <a:schemeClr val="accent1"/>
-          </a:lnRef>
-          <a:fillRef idx="0">
-            <a:schemeClr val="accent1"/>
-          </a:fillRef>
-          <a:effectRef idx="0">
-            <a:schemeClr val="accent1"/>
-          </a:effectRef>
-          <a:fontRef idx="minor">
-            <a:schemeClr val="tx1"/>
-          </a:fontRef>
-        </p:style>
-      </p:cxnSp>
       <p:cxnSp>
         <p:nvCxnSpPr>
           <p:cNvPr id="31" name="Conector recto de flecha 30"/>
@@ -3696,7 +3569,7 @@
         </p:nvCxnSpPr>
         <p:spPr>
           <a:xfrm>
-            <a:off x="3125561" y="2996045"/>
+            <a:off x="3033012" y="3359127"/>
             <a:ext cx="482458" cy="0"/>
           </a:xfrm>
           <a:prstGeom prst="straightConnector1">

</xml_diff>

<commit_message>
The documentation was added.
</commit_message>
<xml_diff>
--- a/doc/Estructura REST.pptx
+++ b/doc/Estructura REST.pptx
@@ -243,7 +243,7 @@
           <a:p>
             <a:fld id="{A63DF546-874D-4130-8EE0-14A9E1B6B679}" type="datetimeFigureOut">
               <a:rPr lang="en-US" smtClean="0"/>
-              <a:t>4/29/2023</a:t>
+              <a:t>4/30/2023</a:t>
             </a:fld>
             <a:endParaRPr lang="en-US"/>
           </a:p>
@@ -413,7 +413,7 @@
           <a:p>
             <a:fld id="{A63DF546-874D-4130-8EE0-14A9E1B6B679}" type="datetimeFigureOut">
               <a:rPr lang="en-US" smtClean="0"/>
-              <a:t>4/29/2023</a:t>
+              <a:t>4/30/2023</a:t>
             </a:fld>
             <a:endParaRPr lang="en-US"/>
           </a:p>
@@ -593,7 +593,7 @@
           <a:p>
             <a:fld id="{A63DF546-874D-4130-8EE0-14A9E1B6B679}" type="datetimeFigureOut">
               <a:rPr lang="en-US" smtClean="0"/>
-              <a:t>4/29/2023</a:t>
+              <a:t>4/30/2023</a:t>
             </a:fld>
             <a:endParaRPr lang="en-US"/>
           </a:p>
@@ -763,7 +763,7 @@
           <a:p>
             <a:fld id="{A63DF546-874D-4130-8EE0-14A9E1B6B679}" type="datetimeFigureOut">
               <a:rPr lang="en-US" smtClean="0"/>
-              <a:t>4/29/2023</a:t>
+              <a:t>4/30/2023</a:t>
             </a:fld>
             <a:endParaRPr lang="en-US"/>
           </a:p>
@@ -1009,7 +1009,7 @@
           <a:p>
             <a:fld id="{A63DF546-874D-4130-8EE0-14A9E1B6B679}" type="datetimeFigureOut">
               <a:rPr lang="en-US" smtClean="0"/>
-              <a:t>4/29/2023</a:t>
+              <a:t>4/30/2023</a:t>
             </a:fld>
             <a:endParaRPr lang="en-US"/>
           </a:p>
@@ -1241,7 +1241,7 @@
           <a:p>
             <a:fld id="{A63DF546-874D-4130-8EE0-14A9E1B6B679}" type="datetimeFigureOut">
               <a:rPr lang="en-US" smtClean="0"/>
-              <a:t>4/29/2023</a:t>
+              <a:t>4/30/2023</a:t>
             </a:fld>
             <a:endParaRPr lang="en-US"/>
           </a:p>
@@ -1608,7 +1608,7 @@
           <a:p>
             <a:fld id="{A63DF546-874D-4130-8EE0-14A9E1B6B679}" type="datetimeFigureOut">
               <a:rPr lang="en-US" smtClean="0"/>
-              <a:t>4/29/2023</a:t>
+              <a:t>4/30/2023</a:t>
             </a:fld>
             <a:endParaRPr lang="en-US"/>
           </a:p>
@@ -1726,7 +1726,7 @@
           <a:p>
             <a:fld id="{A63DF546-874D-4130-8EE0-14A9E1B6B679}" type="datetimeFigureOut">
               <a:rPr lang="en-US" smtClean="0"/>
-              <a:t>4/29/2023</a:t>
+              <a:t>4/30/2023</a:t>
             </a:fld>
             <a:endParaRPr lang="en-US"/>
           </a:p>
@@ -1821,7 +1821,7 @@
           <a:p>
             <a:fld id="{A63DF546-874D-4130-8EE0-14A9E1B6B679}" type="datetimeFigureOut">
               <a:rPr lang="en-US" smtClean="0"/>
-              <a:t>4/29/2023</a:t>
+              <a:t>4/30/2023</a:t>
             </a:fld>
             <a:endParaRPr lang="en-US"/>
           </a:p>
@@ -2098,7 +2098,7 @@
           <a:p>
             <a:fld id="{A63DF546-874D-4130-8EE0-14A9E1B6B679}" type="datetimeFigureOut">
               <a:rPr lang="en-US" smtClean="0"/>
-              <a:t>4/29/2023</a:t>
+              <a:t>4/30/2023</a:t>
             </a:fld>
             <a:endParaRPr lang="en-US"/>
           </a:p>
@@ -2351,7 +2351,7 @@
           <a:p>
             <a:fld id="{A63DF546-874D-4130-8EE0-14A9E1B6B679}" type="datetimeFigureOut">
               <a:rPr lang="en-US" smtClean="0"/>
-              <a:t>4/29/2023</a:t>
+              <a:t>4/30/2023</a:t>
             </a:fld>
             <a:endParaRPr lang="en-US"/>
           </a:p>
@@ -2564,7 +2564,7 @@
           <a:p>
             <a:fld id="{A63DF546-874D-4130-8EE0-14A9E1B6B679}" type="datetimeFigureOut">
               <a:rPr lang="en-US" smtClean="0"/>
-              <a:t>4/29/2023</a:t>
+              <a:t>4/30/2023</a:t>
             </a:fld>
             <a:endParaRPr lang="en-US"/>
           </a:p>
@@ -2969,47 +2969,54 @@
           <a:chExt cx="0" cy="0"/>
         </a:xfrm>
       </p:grpSpPr>
-      <p:pic>
-        <p:nvPicPr>
-          <p:cNvPr id="1026" name="Picture 2" descr="person icon"/>
-          <p:cNvPicPr>
-            <a:picLocks noChangeAspect="1" noChangeArrowheads="1"/>
-          </p:cNvPicPr>
+      <p:sp>
+        <p:nvSpPr>
+          <p:cNvPr id="39" name="Rectángulo 38"/>
+          <p:cNvSpPr/>
           <p:nvPr/>
-        </p:nvPicPr>
-        <p:blipFill>
-          <a:blip r:embed="rId2" cstate="print">
-            <a:extLst>
-              <a:ext uri="{28A0092B-C50C-407E-A947-70E740481C1C}">
-                <a14:useLocalDpi xmlns:a14="http://schemas.microsoft.com/office/drawing/2010/main" val="0"/>
-              </a:ext>
-            </a:extLst>
-          </a:blip>
-          <a:srcRect/>
-          <a:stretch>
-            <a:fillRect/>
-          </a:stretch>
-        </p:blipFill>
-        <p:spPr bwMode="auto">
+        </p:nvSpPr>
+        <p:spPr>
           <a:xfrm>
-            <a:off x="2005820" y="3151229"/>
-            <a:ext cx="1168827" cy="826945"/>
+            <a:off x="2044450" y="2324100"/>
+            <a:ext cx="7605944" cy="2032000"/>
           </a:xfrm>
           <a:prstGeom prst="rect">
             <a:avLst/>
           </a:prstGeom>
-          <a:noFill/>
-          <a:extLst>
-            <a:ext uri="{909E8E84-426E-40DD-AFC4-6F175D3DCCD1}">
-              <a14:hiddenFill xmlns:a14="http://schemas.microsoft.com/office/drawing/2010/main">
-                <a:solidFill>
-                  <a:srgbClr val="FFFFFF"/>
-                </a:solidFill>
-              </a14:hiddenFill>
-            </a:ext>
-          </a:extLst>
+          <a:solidFill>
+            <a:srgbClr val="171515"/>
+          </a:solidFill>
+          <a:ln>
+            <a:solidFill>
+              <a:srgbClr val="171515"/>
+            </a:solidFill>
+          </a:ln>
         </p:spPr>
-      </p:pic>
+        <p:style>
+          <a:lnRef idx="2">
+            <a:schemeClr val="accent1">
+              <a:shade val="50000"/>
+            </a:schemeClr>
+          </a:lnRef>
+          <a:fillRef idx="1">
+            <a:schemeClr val="accent1"/>
+          </a:fillRef>
+          <a:effectRef idx="0">
+            <a:schemeClr val="accent1"/>
+          </a:effectRef>
+          <a:fontRef idx="minor">
+            <a:schemeClr val="lt1"/>
+          </a:fontRef>
+        </p:style>
+        <p:txBody>
+          <a:bodyPr rtlCol="0" anchor="ctr"/>
+          <a:lstStyle/>
+          <a:p>
+            <a:pPr algn="ctr"/>
+            <a:endParaRPr lang="en-US"/>
+          </a:p>
+        </p:txBody>
+      </p:sp>
       <p:sp>
         <p:nvSpPr>
           <p:cNvPr id="4" name="Terminador 3"/>
@@ -3143,14 +3150,179 @@
       </p:cxnSp>
       <p:sp>
         <p:nvSpPr>
-          <p:cNvPr id="7" name="Rectángulo redondeado 6"/>
+          <p:cNvPr id="23" name="Rectángulo 22"/>
           <p:cNvSpPr/>
           <p:nvPr/>
         </p:nvSpPr>
         <p:spPr>
           <a:xfrm>
-            <a:off x="4998249" y="3096877"/>
-            <a:ext cx="629142" cy="534501"/>
+            <a:off x="4227705" y="3151229"/>
+            <a:ext cx="901208" cy="400110"/>
+          </a:xfrm>
+          <a:prstGeom prst="rect">
+            <a:avLst/>
+          </a:prstGeom>
+          <a:noFill/>
+        </p:spPr>
+        <p:txBody>
+          <a:bodyPr wrap="none" lIns="91440" tIns="45720" rIns="91440" bIns="45720">
+            <a:spAutoFit/>
+          </a:bodyPr>
+          <a:lstStyle/>
+          <a:p>
+            <a:pPr algn="ctr"/>
+            <a:r>
+              <a:rPr lang="es-ES" sz="2000" b="0" cap="none" spc="0" dirty="0" smtClean="0">
+                <a:ln w="0"/>
+                <a:solidFill>
+                  <a:schemeClr val="tx1"/>
+                </a:solidFill>
+                <a:effectLst>
+                  <a:outerShdw blurRad="38100" dist="19050" dir="2700000" algn="tl" rotWithShape="0">
+                    <a:schemeClr val="dk1">
+                      <a:alpha val="40000"/>
+                    </a:schemeClr>
+                  </a:outerShdw>
+                </a:effectLst>
+              </a:rPr>
+              <a:t>Routes</a:t>
+            </a:r>
+            <a:endParaRPr lang="es-ES" sz="2000" b="0" cap="none" spc="0" dirty="0">
+              <a:ln w="0"/>
+              <a:solidFill>
+                <a:schemeClr val="tx1"/>
+              </a:solidFill>
+              <a:effectLst>
+                <a:outerShdw blurRad="38100" dist="19050" dir="2700000" algn="tl" rotWithShape="0">
+                  <a:schemeClr val="dk1">
+                    <a:alpha val="40000"/>
+                  </a:schemeClr>
+                </a:outerShdw>
+              </a:effectLst>
+            </a:endParaRPr>
+          </a:p>
+        </p:txBody>
+      </p:sp>
+      <p:sp>
+        <p:nvSpPr>
+          <p:cNvPr id="24" name="Rectángulo 23"/>
+          <p:cNvSpPr/>
+          <p:nvPr/>
+        </p:nvSpPr>
+        <p:spPr>
+          <a:xfrm>
+            <a:off x="7359849" y="3164070"/>
+            <a:ext cx="861133" cy="400110"/>
+          </a:xfrm>
+          <a:prstGeom prst="rect">
+            <a:avLst/>
+          </a:prstGeom>
+          <a:noFill/>
+        </p:spPr>
+        <p:txBody>
+          <a:bodyPr wrap="none" lIns="91440" tIns="45720" rIns="91440" bIns="45720">
+            <a:spAutoFit/>
+          </a:bodyPr>
+          <a:lstStyle/>
+          <a:p>
+            <a:pPr algn="ctr"/>
+            <a:r>
+              <a:rPr lang="es-ES" sz="2000" b="0" cap="none" spc="0" dirty="0" smtClean="0">
+                <a:ln w="0"/>
+                <a:solidFill>
+                  <a:schemeClr val="tx1"/>
+                </a:solidFill>
+                <a:effectLst>
+                  <a:outerShdw blurRad="38100" dist="19050" dir="2700000" algn="tl" rotWithShape="0">
+                    <a:schemeClr val="dk1">
+                      <a:alpha val="40000"/>
+                    </a:schemeClr>
+                  </a:outerShdw>
+                </a:effectLst>
+              </a:rPr>
+              <a:t>Model</a:t>
+            </a:r>
+            <a:endParaRPr lang="es-ES" sz="2000" b="0" cap="none" spc="0" dirty="0">
+              <a:ln w="0"/>
+              <a:solidFill>
+                <a:schemeClr val="tx1"/>
+              </a:solidFill>
+              <a:effectLst>
+                <a:outerShdw blurRad="38100" dist="19050" dir="2700000" algn="tl" rotWithShape="0">
+                  <a:schemeClr val="dk1">
+                    <a:alpha val="40000"/>
+                  </a:schemeClr>
+                </a:outerShdw>
+              </a:effectLst>
+            </a:endParaRPr>
+          </a:p>
+        </p:txBody>
+      </p:sp>
+      <p:sp>
+        <p:nvSpPr>
+          <p:cNvPr id="25" name="Rectángulo 24"/>
+          <p:cNvSpPr/>
+          <p:nvPr/>
+        </p:nvSpPr>
+        <p:spPr>
+          <a:xfrm>
+            <a:off x="5577060" y="3151229"/>
+            <a:ext cx="1231363" cy="400110"/>
+          </a:xfrm>
+          <a:prstGeom prst="rect">
+            <a:avLst/>
+          </a:prstGeom>
+          <a:noFill/>
+        </p:spPr>
+        <p:txBody>
+          <a:bodyPr wrap="none" lIns="91440" tIns="45720" rIns="91440" bIns="45720">
+            <a:spAutoFit/>
+          </a:bodyPr>
+          <a:lstStyle/>
+          <a:p>
+            <a:pPr algn="ctr"/>
+            <a:r>
+              <a:rPr lang="es-ES" sz="2000" b="0" cap="none" spc="0" dirty="0" smtClean="0">
+                <a:ln w="0"/>
+                <a:solidFill>
+                  <a:schemeClr val="tx1"/>
+                </a:solidFill>
+                <a:effectLst>
+                  <a:outerShdw blurRad="38100" dist="19050" dir="2700000" algn="tl" rotWithShape="0">
+                    <a:schemeClr val="dk1">
+                      <a:alpha val="40000"/>
+                    </a:schemeClr>
+                  </a:outerShdw>
+                </a:effectLst>
+              </a:rPr>
+              <a:t>Controller</a:t>
+            </a:r>
+            <a:endParaRPr lang="es-ES" sz="2000" b="0" cap="none" spc="0" dirty="0">
+              <a:ln w="0"/>
+              <a:solidFill>
+                <a:schemeClr val="tx1"/>
+              </a:solidFill>
+              <a:effectLst>
+                <a:outerShdw blurRad="38100" dist="19050" dir="2700000" algn="tl" rotWithShape="0">
+                  <a:schemeClr val="dk1">
+                    <a:alpha val="40000"/>
+                  </a:schemeClr>
+                </a:outerShdw>
+              </a:effectLst>
+            </a:endParaRPr>
+          </a:p>
+        </p:txBody>
+      </p:sp>
+      <p:sp>
+        <p:nvSpPr>
+          <p:cNvPr id="26" name="Rectángulo redondeado 25"/>
+          <p:cNvSpPr/>
+          <p:nvPr/>
+        </p:nvSpPr>
+        <p:spPr>
+          <a:xfrm>
+            <a:off x="3429130" y="2860716"/>
+            <a:ext cx="853310" cy="336053"/>
           </a:xfrm>
           <a:prstGeom prst="roundRect">
             <a:avLst/>
@@ -3218,7 +3390,7 @@
                 <a:ea typeface="Calibri" panose="020F0502020204030204" pitchFamily="34" charset="0"/>
                 <a:cs typeface="Times New Roman" panose="02020603050405020304" pitchFamily="18" charset="0"/>
               </a:rPr>
-              <a:t>DTO</a:t>
+              <a:t>REQUEST</a:t>
             </a:r>
             <a:endParaRPr lang="en-US" b="1" dirty="0">
               <a:effectLst/>
@@ -3228,16 +3400,287 @@
           </a:p>
         </p:txBody>
       </p:sp>
-      <p:sp>
-        <p:nvSpPr>
-          <p:cNvPr id="14" name="Rectángulo redondeado 13"/>
+      <p:cxnSp>
+        <p:nvCxnSpPr>
+          <p:cNvPr id="31" name="Conector recto de flecha 30"/>
+          <p:cNvCxnSpPr>
+            <a:endCxn id="26" idx="1"/>
+          </p:cNvCxnSpPr>
+          <p:nvPr/>
+        </p:nvCxnSpPr>
+        <p:spPr>
+          <a:xfrm>
+            <a:off x="2946672" y="3028743"/>
+            <a:ext cx="482458" cy="0"/>
+          </a:xfrm>
+          <a:prstGeom prst="straightConnector1">
+            <a:avLst/>
+          </a:prstGeom>
+          <a:ln w="38100">
+            <a:solidFill>
+              <a:schemeClr val="accent6">
+                <a:lumMod val="50000"/>
+              </a:schemeClr>
+            </a:solidFill>
+            <a:tailEnd type="triangle"/>
+          </a:ln>
+        </p:spPr>
+        <p:style>
+          <a:lnRef idx="1">
+            <a:schemeClr val="accent1"/>
+          </a:lnRef>
+          <a:fillRef idx="0">
+            <a:schemeClr val="accent1"/>
+          </a:fillRef>
+          <a:effectRef idx="0">
+            <a:schemeClr val="accent1"/>
+          </a:effectRef>
+          <a:fontRef idx="minor">
+            <a:schemeClr val="tx1"/>
+          </a:fontRef>
+        </p:style>
+      </p:cxnSp>
+      <p:grpSp>
+        <p:nvGrpSpPr>
+          <p:cNvPr id="37" name="Grupo 36"/>
+          <p:cNvGrpSpPr/>
+          <p:nvPr/>
+        </p:nvGrpSpPr>
+        <p:grpSpPr>
+          <a:xfrm>
+            <a:off x="8966963" y="2664973"/>
+            <a:ext cx="683431" cy="1075060"/>
+            <a:chOff x="9051814" y="2630781"/>
+            <a:chExt cx="683431" cy="1075060"/>
+          </a:xfrm>
+        </p:grpSpPr>
+        <p:sp>
+          <p:nvSpPr>
+            <p:cNvPr id="36" name="Rectángulo 35"/>
+            <p:cNvSpPr/>
+            <p:nvPr/>
+          </p:nvSpPr>
+          <p:spPr>
+            <a:xfrm>
+              <a:off x="9123262" y="2630781"/>
+              <a:ext cx="540534" cy="461665"/>
+            </a:xfrm>
+            <a:prstGeom prst="rect">
+              <a:avLst/>
+            </a:prstGeom>
+            <a:noFill/>
+          </p:spPr>
+          <p:txBody>
+            <a:bodyPr wrap="none" lIns="91440" tIns="45720" rIns="91440" bIns="45720">
+              <a:spAutoFit/>
+            </a:bodyPr>
+            <a:lstStyle/>
+            <a:p>
+              <a:pPr algn="ctr"/>
+              <a:r>
+                <a:rPr lang="es-ES" sz="2400" b="0" cap="none" spc="0" dirty="0" smtClean="0">
+                  <a:ln w="0"/>
+                  <a:solidFill>
+                    <a:schemeClr val="bg1"/>
+                  </a:solidFill>
+                  <a:effectLst>
+                    <a:outerShdw blurRad="38100" dist="19050" dir="2700000" algn="tl" rotWithShape="0">
+                      <a:schemeClr val="dk1">
+                        <a:alpha val="40000"/>
+                      </a:schemeClr>
+                    </a:outerShdw>
+                  </a:effectLst>
+                </a:rPr>
+                <a:t>DB</a:t>
+              </a:r>
+              <a:endParaRPr lang="es-ES" sz="2400" b="0" cap="none" spc="0" dirty="0">
+                <a:ln w="0"/>
+                <a:solidFill>
+                  <a:schemeClr val="bg1"/>
+                </a:solidFill>
+                <a:effectLst>
+                  <a:outerShdw blurRad="38100" dist="19050" dir="2700000" algn="tl" rotWithShape="0">
+                    <a:schemeClr val="dk1">
+                      <a:alpha val="40000"/>
+                    </a:schemeClr>
+                  </a:outerShdw>
+                </a:effectLst>
+              </a:endParaRPr>
+            </a:p>
+          </p:txBody>
+        </p:sp>
+        <p:pic>
+          <p:nvPicPr>
+            <p:cNvPr id="1028" name="Picture 4" descr="Database - Free technology icons"/>
+            <p:cNvPicPr>
+              <a:picLocks noChangeAspect="1" noChangeArrowheads="1"/>
+            </p:cNvPicPr>
+            <p:nvPr/>
+          </p:nvPicPr>
+          <p:blipFill>
+            <a:blip r:embed="rId2" cstate="print">
+              <a:lum bright="70000" contrast="-70000"/>
+              <a:extLst>
+                <a:ext uri="{28A0092B-C50C-407E-A947-70E740481C1C}">
+                  <a14:useLocalDpi xmlns:a14="http://schemas.microsoft.com/office/drawing/2010/main" val="0"/>
+                </a:ext>
+              </a:extLst>
+            </a:blip>
+            <a:srcRect/>
+            <a:stretch>
+              <a:fillRect/>
+            </a:stretch>
+          </p:blipFill>
+          <p:spPr bwMode="auto">
+            <a:xfrm>
+              <a:off x="9051814" y="3022410"/>
+              <a:ext cx="683431" cy="683431"/>
+            </a:xfrm>
+            <a:prstGeom prst="rect">
+              <a:avLst/>
+            </a:prstGeom>
+            <a:noFill/>
+            <a:extLst>
+              <a:ext uri="{909E8E84-426E-40DD-AFC4-6F175D3DCCD1}">
+                <a14:hiddenFill xmlns:a14="http://schemas.microsoft.com/office/drawing/2010/main">
+                  <a:solidFill>
+                    <a:srgbClr val="FFFFFF"/>
+                  </a:solidFill>
+                </a14:hiddenFill>
+              </a:ext>
+            </a:extLst>
+          </p:spPr>
+        </p:pic>
+      </p:grpSp>
+      <p:cxnSp>
+        <p:nvCxnSpPr>
+          <p:cNvPr id="38" name="Conector recto de flecha 37"/>
+          <p:cNvCxnSpPr>
+            <a:stCxn id="24" idx="3"/>
+          </p:cNvCxnSpPr>
+          <p:nvPr/>
+        </p:nvCxnSpPr>
+        <p:spPr>
+          <a:xfrm>
+            <a:off x="8220982" y="3364125"/>
+            <a:ext cx="636406" cy="0"/>
+          </a:xfrm>
+          <a:prstGeom prst="straightConnector1">
+            <a:avLst/>
+          </a:prstGeom>
+          <a:ln w="38100">
+            <a:solidFill>
+              <a:schemeClr val="accent6">
+                <a:lumMod val="50000"/>
+              </a:schemeClr>
+            </a:solidFill>
+            <a:headEnd type="triangle"/>
+            <a:tailEnd type="triangle"/>
+          </a:ln>
+        </p:spPr>
+        <p:style>
+          <a:lnRef idx="1">
+            <a:schemeClr val="accent1"/>
+          </a:lnRef>
+          <a:fillRef idx="0">
+            <a:schemeClr val="accent1"/>
+          </a:fillRef>
+          <a:effectRef idx="0">
+            <a:schemeClr val="accent1"/>
+          </a:effectRef>
+          <a:fontRef idx="minor">
+            <a:schemeClr val="tx1"/>
+          </a:fontRef>
+        </p:style>
+      </p:cxnSp>
+      <p:cxnSp>
+        <p:nvCxnSpPr>
+          <p:cNvPr id="19" name="Conector recto de flecha 18"/>
+          <p:cNvCxnSpPr/>
+          <p:nvPr/>
+        </p:nvCxnSpPr>
+        <p:spPr>
+          <a:xfrm>
+            <a:off x="5105400" y="3375451"/>
+            <a:ext cx="463889" cy="0"/>
+          </a:xfrm>
+          <a:prstGeom prst="straightConnector1">
+            <a:avLst/>
+          </a:prstGeom>
+          <a:ln w="28575">
+            <a:solidFill>
+              <a:schemeClr val="accent6">
+                <a:lumMod val="50000"/>
+              </a:schemeClr>
+            </a:solidFill>
+            <a:headEnd type="triangle"/>
+            <a:tailEnd type="triangle"/>
+          </a:ln>
+        </p:spPr>
+        <p:style>
+          <a:lnRef idx="1">
+            <a:schemeClr val="accent1"/>
+          </a:lnRef>
+          <a:fillRef idx="0">
+            <a:schemeClr val="accent1"/>
+          </a:fillRef>
+          <a:effectRef idx="0">
+            <a:schemeClr val="accent1"/>
+          </a:effectRef>
+          <a:fontRef idx="minor">
+            <a:schemeClr val="tx1"/>
+          </a:fontRef>
+        </p:style>
+      </p:cxnSp>
+      <p:cxnSp>
+        <p:nvCxnSpPr>
+          <p:cNvPr id="22" name="Conector recto de flecha 21"/>
+          <p:cNvCxnSpPr/>
+          <p:nvPr/>
+        </p:nvCxnSpPr>
+        <p:spPr>
+          <a:xfrm>
+            <a:off x="6841498" y="3375451"/>
+            <a:ext cx="463889" cy="0"/>
+          </a:xfrm>
+          <a:prstGeom prst="straightConnector1">
+            <a:avLst/>
+          </a:prstGeom>
+          <a:ln w="28575">
+            <a:solidFill>
+              <a:schemeClr val="accent6">
+                <a:lumMod val="50000"/>
+              </a:schemeClr>
+            </a:solidFill>
+            <a:headEnd type="triangle"/>
+            <a:tailEnd type="triangle"/>
+          </a:ln>
+        </p:spPr>
+        <p:style>
+          <a:lnRef idx="1">
+            <a:schemeClr val="accent1"/>
+          </a:lnRef>
+          <a:fillRef idx="0">
+            <a:schemeClr val="accent1"/>
+          </a:fillRef>
+          <a:effectRef idx="0">
+            <a:schemeClr val="accent1"/>
+          </a:effectRef>
+          <a:fontRef idx="minor">
+            <a:schemeClr val="tx1"/>
+          </a:fontRef>
+        </p:style>
+      </p:cxnSp>
+      <p:sp>
+        <p:nvSpPr>
+          <p:cNvPr id="27" name="Rectángulo redondeado 26"/>
           <p:cNvSpPr/>
           <p:nvPr/>
         </p:nvSpPr>
         <p:spPr>
           <a:xfrm>
-            <a:off x="6685369" y="3096876"/>
-            <a:ext cx="655232" cy="534501"/>
+            <a:off x="3429130" y="3569486"/>
+            <a:ext cx="853310" cy="336053"/>
           </a:xfrm>
           <a:prstGeom prst="roundRect">
             <a:avLst/>
@@ -3292,264 +3735,11 @@
               </a:spcAft>
             </a:pPr>
             <a:r>
-              <a:rPr lang="es-AR" sz="1000" b="1" dirty="0" smtClean="0">
-                <a:effectLst/>
+              <a:rPr lang="es-AR" sz="1100" b="1" dirty="0" smtClean="0">
                 <a:ea typeface="Calibri" panose="020F0502020204030204" pitchFamily="34" charset="0"/>
                 <a:cs typeface="Times New Roman" panose="02020603050405020304" pitchFamily="18" charset="0"/>
               </a:rPr>
-              <a:t>MODEL</a:t>
-            </a:r>
-            <a:endParaRPr lang="en-US" sz="1400" b="1" dirty="0">
-              <a:effectLst/>
-              <a:ea typeface="Calibri" panose="020F0502020204030204" pitchFamily="34" charset="0"/>
-              <a:cs typeface="Times New Roman" panose="02020603050405020304" pitchFamily="18" charset="0"/>
-            </a:endParaRPr>
-          </a:p>
-        </p:txBody>
-      </p:sp>
-      <p:sp>
-        <p:nvSpPr>
-          <p:cNvPr id="23" name="Rectángulo 22"/>
-          <p:cNvSpPr/>
-          <p:nvPr/>
-        </p:nvSpPr>
-        <p:spPr>
-          <a:xfrm>
-            <a:off x="4075847" y="3151229"/>
-            <a:ext cx="901208" cy="400110"/>
-          </a:xfrm>
-          <a:prstGeom prst="rect">
-            <a:avLst/>
-          </a:prstGeom>
-          <a:noFill/>
-        </p:spPr>
-        <p:txBody>
-          <a:bodyPr wrap="none" lIns="91440" tIns="45720" rIns="91440" bIns="45720">
-            <a:spAutoFit/>
-          </a:bodyPr>
-          <a:lstStyle/>
-          <a:p>
-            <a:pPr algn="ctr"/>
-            <a:r>
-              <a:rPr lang="es-ES" sz="2000" b="0" cap="none" spc="0" dirty="0" smtClean="0">
-                <a:ln w="0"/>
-                <a:solidFill>
-                  <a:schemeClr val="tx1"/>
-                </a:solidFill>
-                <a:effectLst>
-                  <a:outerShdw blurRad="38100" dist="19050" dir="2700000" algn="tl" rotWithShape="0">
-                    <a:schemeClr val="dk1">
-                      <a:alpha val="40000"/>
-                    </a:schemeClr>
-                  </a:outerShdw>
-                </a:effectLst>
-              </a:rPr>
-              <a:t>Routes</a:t>
-            </a:r>
-            <a:endParaRPr lang="es-ES" sz="2000" b="0" cap="none" spc="0" dirty="0">
-              <a:ln w="0"/>
-              <a:solidFill>
-                <a:schemeClr val="tx1"/>
-              </a:solidFill>
-              <a:effectLst>
-                <a:outerShdw blurRad="38100" dist="19050" dir="2700000" algn="tl" rotWithShape="0">
-                  <a:schemeClr val="dk1">
-                    <a:alpha val="40000"/>
-                  </a:schemeClr>
-                </a:outerShdw>
-              </a:effectLst>
-            </a:endParaRPr>
-          </a:p>
-        </p:txBody>
-      </p:sp>
-      <p:sp>
-        <p:nvSpPr>
-          <p:cNvPr id="24" name="Rectángulo 23"/>
-          <p:cNvSpPr/>
-          <p:nvPr/>
-        </p:nvSpPr>
-        <p:spPr>
-          <a:xfrm>
-            <a:off x="7276274" y="3164071"/>
-            <a:ext cx="1302664" cy="400110"/>
-          </a:xfrm>
-          <a:prstGeom prst="rect">
-            <a:avLst/>
-          </a:prstGeom>
-          <a:noFill/>
-        </p:spPr>
-        <p:txBody>
-          <a:bodyPr wrap="none" lIns="91440" tIns="45720" rIns="91440" bIns="45720">
-            <a:spAutoFit/>
-          </a:bodyPr>
-          <a:lstStyle/>
-          <a:p>
-            <a:pPr algn="ctr"/>
-            <a:r>
-              <a:rPr lang="es-ES" sz="2000" b="0" cap="none" spc="0" dirty="0" smtClean="0">
-                <a:ln w="0"/>
-                <a:solidFill>
-                  <a:schemeClr val="tx1"/>
-                </a:solidFill>
-                <a:effectLst>
-                  <a:outerShdw blurRad="38100" dist="19050" dir="2700000" algn="tl" rotWithShape="0">
-                    <a:schemeClr val="dk1">
-                      <a:alpha val="40000"/>
-                    </a:schemeClr>
-                  </a:outerShdw>
-                </a:effectLst>
-              </a:rPr>
-              <a:t>Repository</a:t>
-            </a:r>
-            <a:endParaRPr lang="es-ES" sz="2000" b="0" cap="none" spc="0" dirty="0">
-              <a:ln w="0"/>
-              <a:solidFill>
-                <a:schemeClr val="tx1"/>
-              </a:solidFill>
-              <a:effectLst>
-                <a:outerShdw blurRad="38100" dist="19050" dir="2700000" algn="tl" rotWithShape="0">
-                  <a:schemeClr val="dk1">
-                    <a:alpha val="40000"/>
-                  </a:schemeClr>
-                </a:outerShdw>
-              </a:effectLst>
-            </a:endParaRPr>
-          </a:p>
-        </p:txBody>
-      </p:sp>
-      <p:sp>
-        <p:nvSpPr>
-          <p:cNvPr id="25" name="Rectángulo 24"/>
-          <p:cNvSpPr/>
-          <p:nvPr/>
-        </p:nvSpPr>
-        <p:spPr>
-          <a:xfrm>
-            <a:off x="5513007" y="3164071"/>
-            <a:ext cx="1327992" cy="400110"/>
-          </a:xfrm>
-          <a:prstGeom prst="rect">
-            <a:avLst/>
-          </a:prstGeom>
-          <a:noFill/>
-        </p:spPr>
-        <p:txBody>
-          <a:bodyPr wrap="none" lIns="91440" tIns="45720" rIns="91440" bIns="45720">
-            <a:spAutoFit/>
-          </a:bodyPr>
-          <a:lstStyle/>
-          <a:p>
-            <a:pPr algn="ctr"/>
-            <a:r>
-              <a:rPr lang="es-ES" sz="2000" b="0" cap="none" spc="0" dirty="0" smtClean="0">
-                <a:ln w="0"/>
-                <a:solidFill>
-                  <a:schemeClr val="tx1"/>
-                </a:solidFill>
-                <a:effectLst>
-                  <a:outerShdw blurRad="38100" dist="19050" dir="2700000" algn="tl" rotWithShape="0">
-                    <a:schemeClr val="dk1">
-                      <a:alpha val="40000"/>
-                    </a:schemeClr>
-                  </a:outerShdw>
-                </a:effectLst>
-              </a:rPr>
-              <a:t>Controllers</a:t>
-            </a:r>
-            <a:endParaRPr lang="es-ES" sz="2000" b="0" cap="none" spc="0" dirty="0">
-              <a:ln w="0"/>
-              <a:solidFill>
-                <a:schemeClr val="tx1"/>
-              </a:solidFill>
-              <a:effectLst>
-                <a:outerShdw blurRad="38100" dist="19050" dir="2700000" algn="tl" rotWithShape="0">
-                  <a:schemeClr val="dk1">
-                    <a:alpha val="40000"/>
-                  </a:schemeClr>
-                </a:outerShdw>
-              </a:effectLst>
-            </a:endParaRPr>
-          </a:p>
-        </p:txBody>
-      </p:sp>
-      <p:sp>
-        <p:nvSpPr>
-          <p:cNvPr id="26" name="Rectángulo redondeado 25"/>
-          <p:cNvSpPr/>
-          <p:nvPr/>
-        </p:nvSpPr>
-        <p:spPr>
-          <a:xfrm>
-            <a:off x="3515470" y="3191100"/>
-            <a:ext cx="565603" cy="336053"/>
-          </a:xfrm>
-          <a:prstGeom prst="roundRect">
-            <a:avLst/>
-          </a:prstGeom>
-          <a:solidFill>
-            <a:schemeClr val="accent6">
-              <a:lumMod val="75000"/>
-            </a:schemeClr>
-          </a:solidFill>
-          <a:ln>
-            <a:solidFill>
-              <a:schemeClr val="accent6">
-                <a:lumMod val="50000"/>
-              </a:schemeClr>
-            </a:solidFill>
-          </a:ln>
-        </p:spPr>
-        <p:style>
-          <a:lnRef idx="2">
-            <a:schemeClr val="accent1">
-              <a:shade val="50000"/>
-            </a:schemeClr>
-          </a:lnRef>
-          <a:fillRef idx="1">
-            <a:schemeClr val="accent1"/>
-          </a:fillRef>
-          <a:effectRef idx="0">
-            <a:schemeClr val="accent1"/>
-          </a:effectRef>
-          <a:fontRef idx="minor">
-            <a:schemeClr val="lt1"/>
-          </a:fontRef>
-        </p:style>
-        <p:txBody>
-          <a:bodyPr rot="0" spcFirstLastPara="0" vert="horz" wrap="square" lIns="91440" tIns="45720" rIns="91440" bIns="45720" numCol="1" spcCol="0" rtlCol="0" fromWordArt="0" anchor="ctr" anchorCtr="0" forceAA="0" compatLnSpc="1">
-            <a:prstTxWarp prst="textNoShape">
-              <a:avLst/>
-            </a:prstTxWarp>
-            <a:noAutofit/>
-          </a:bodyPr>
-          <a:lstStyle/>
-          <a:p>
-            <a:pPr marL="0" marR="0" algn="ctr">
-              <a:lnSpc>
-                <a:spcPct val="107000"/>
-              </a:lnSpc>
-              <a:spcBef>
-                <a:spcPts val="0"/>
-              </a:spcBef>
-              <a:spcAft>
-                <a:spcPts val="800"/>
-              </a:spcAft>
-            </a:pPr>
-            <a:r>
-              <a:rPr lang="es-AR" sz="1100" b="1" dirty="0">
-                <a:effectLst/>
-                <a:ea typeface="Calibri" panose="020F0502020204030204" pitchFamily="34" charset="0"/>
-                <a:cs typeface="Times New Roman" panose="02020603050405020304" pitchFamily="18" charset="0"/>
-              </a:rPr>
-              <a:t> </a:t>
-            </a:r>
-            <a:r>
-              <a:rPr lang="es-AR" sz="1100" b="1" dirty="0" smtClean="0">
-                <a:effectLst/>
-                <a:ea typeface="Calibri" panose="020F0502020204030204" pitchFamily="34" charset="0"/>
-                <a:cs typeface="Times New Roman" panose="02020603050405020304" pitchFamily="18" charset="0"/>
-              </a:rPr>
-              <a:t>JSON</a:t>
+              <a:t>RESPONSE</a:t>
             </a:r>
             <a:endParaRPr lang="en-US" b="1" dirty="0">
               <a:effectLst/>
@@ -3561,21 +3751,21 @@
       </p:sp>
       <p:cxnSp>
         <p:nvCxnSpPr>
-          <p:cNvPr id="31" name="Conector recto de flecha 30"/>
+          <p:cNvPr id="28" name="Conector recto de flecha 27"/>
           <p:cNvCxnSpPr>
-            <a:endCxn id="26" idx="1"/>
+            <a:stCxn id="27" idx="1"/>
           </p:cNvCxnSpPr>
           <p:nvPr/>
         </p:nvCxnSpPr>
         <p:spPr>
-          <a:xfrm>
-            <a:off x="3033012" y="3359127"/>
+          <a:xfrm flipH="1">
+            <a:off x="2946672" y="3737513"/>
             <a:ext cx="482458" cy="0"/>
           </a:xfrm>
           <a:prstGeom prst="straightConnector1">
             <a:avLst/>
           </a:prstGeom>
-          <a:ln w="28575">
+          <a:ln w="38100">
             <a:solidFill>
               <a:schemeClr val="accent6">
                 <a:lumMod val="50000"/>
@@ -3599,34 +3789,63 @@
           </a:fontRef>
         </p:style>
       </p:cxnSp>
-      <p:sp>
-        <p:nvSpPr>
-          <p:cNvPr id="35" name="Rectángulo 34"/>
-          <p:cNvSpPr/>
+      <p:grpSp>
+        <p:nvGrpSpPr>
+          <p:cNvPr id="41" name="Grupo 40"/>
+          <p:cNvGrpSpPr/>
           <p:nvPr/>
-        </p:nvSpPr>
-        <p:spPr>
+        </p:nvGrpSpPr>
+        <p:grpSpPr>
           <a:xfrm>
-            <a:off x="2138122" y="2766438"/>
-            <a:ext cx="904735" cy="461665"/>
+            <a:off x="2044450" y="2769583"/>
+            <a:ext cx="904735" cy="1102881"/>
+            <a:chOff x="2044450" y="2769583"/>
+            <a:chExt cx="904735" cy="1102881"/>
           </a:xfrm>
-          <a:prstGeom prst="rect">
-            <a:avLst/>
-          </a:prstGeom>
-          <a:noFill/>
-        </p:spPr>
-        <p:txBody>
-          <a:bodyPr wrap="none" lIns="91440" tIns="45720" rIns="91440" bIns="45720">
-            <a:spAutoFit/>
-          </a:bodyPr>
-          <a:lstStyle/>
-          <a:p>
-            <a:pPr algn="ctr"/>
-            <a:r>
-              <a:rPr lang="es-ES" sz="2400" b="0" cap="none" spc="0" dirty="0" smtClean="0">
+        </p:grpSpPr>
+        <p:sp>
+          <p:nvSpPr>
+            <p:cNvPr id="35" name="Rectángulo 34"/>
+            <p:cNvSpPr/>
+            <p:nvPr/>
+          </p:nvSpPr>
+          <p:spPr>
+            <a:xfrm>
+              <a:off x="2044450" y="2769583"/>
+              <a:ext cx="904735" cy="461665"/>
+            </a:xfrm>
+            <a:prstGeom prst="rect">
+              <a:avLst/>
+            </a:prstGeom>
+            <a:noFill/>
+          </p:spPr>
+          <p:txBody>
+            <a:bodyPr wrap="none" lIns="91440" tIns="45720" rIns="91440" bIns="45720">
+              <a:spAutoFit/>
+            </a:bodyPr>
+            <a:lstStyle/>
+            <a:p>
+              <a:pPr algn="ctr"/>
+              <a:r>
+                <a:rPr lang="es-ES" sz="2400" b="0" cap="none" spc="0" dirty="0" smtClean="0">
+                  <a:ln w="0"/>
+                  <a:solidFill>
+                    <a:schemeClr val="bg1"/>
+                  </a:solidFill>
+                  <a:effectLst>
+                    <a:outerShdw blurRad="38100" dist="19050" dir="2700000" algn="tl" rotWithShape="0">
+                      <a:schemeClr val="dk1">
+                        <a:alpha val="40000"/>
+                      </a:schemeClr>
+                    </a:outerShdw>
+                  </a:effectLst>
+                </a:rPr>
+                <a:t>Client</a:t>
+              </a:r>
+              <a:endParaRPr lang="es-ES" sz="2400" b="0" cap="none" spc="0" dirty="0">
                 <a:ln w="0"/>
                 <a:solidFill>
-                  <a:schemeClr val="tx1"/>
+                  <a:schemeClr val="bg1"/>
                 </a:solidFill>
                 <a:effectLst>
                   <a:outerShdw blurRad="38100" dist="19050" dir="2700000" algn="tl" rotWithShape="0">
@@ -3635,162 +3854,51 @@
                     </a:schemeClr>
                   </a:outerShdw>
                 </a:effectLst>
-              </a:rPr>
-              <a:t>Client</a:t>
-            </a:r>
-            <a:endParaRPr lang="es-ES" sz="2400" b="0" cap="none" spc="0" dirty="0">
-              <a:ln w="0"/>
-              <a:solidFill>
-                <a:schemeClr val="tx1"/>
-              </a:solidFill>
-              <a:effectLst>
-                <a:outerShdw blurRad="38100" dist="19050" dir="2700000" algn="tl" rotWithShape="0">
-                  <a:schemeClr val="dk1">
-                    <a:alpha val="40000"/>
-                  </a:schemeClr>
-                </a:outerShdw>
-              </a:effectLst>
-            </a:endParaRPr>
-          </a:p>
-        </p:txBody>
-      </p:sp>
-      <p:sp>
-        <p:nvSpPr>
-          <p:cNvPr id="36" name="Rectángulo 35"/>
-          <p:cNvSpPr/>
-          <p:nvPr/>
-        </p:nvSpPr>
-        <p:spPr>
-          <a:xfrm>
-            <a:off x="9123262" y="2630781"/>
-            <a:ext cx="540534" cy="461665"/>
-          </a:xfrm>
-          <a:prstGeom prst="rect">
-            <a:avLst/>
-          </a:prstGeom>
-          <a:noFill/>
-        </p:spPr>
-        <p:txBody>
-          <a:bodyPr wrap="none" lIns="91440" tIns="45720" rIns="91440" bIns="45720">
-            <a:spAutoFit/>
-          </a:bodyPr>
-          <a:lstStyle/>
-          <a:p>
-            <a:pPr algn="ctr"/>
-            <a:r>
-              <a:rPr lang="es-ES" sz="2400" b="0" cap="none" spc="0" dirty="0" smtClean="0">
-                <a:ln w="0"/>
-                <a:solidFill>
-                  <a:schemeClr val="tx1"/>
-                </a:solidFill>
-                <a:effectLst>
-                  <a:outerShdw blurRad="38100" dist="19050" dir="2700000" algn="tl" rotWithShape="0">
-                    <a:schemeClr val="dk1">
-                      <a:alpha val="40000"/>
-                    </a:schemeClr>
-                  </a:outerShdw>
-                </a:effectLst>
-              </a:rPr>
-              <a:t>DB</a:t>
-            </a:r>
-            <a:endParaRPr lang="es-ES" sz="2400" b="0" cap="none" spc="0" dirty="0">
-              <a:ln w="0"/>
-              <a:solidFill>
-                <a:schemeClr val="tx1"/>
-              </a:solidFill>
-              <a:effectLst>
-                <a:outerShdw blurRad="38100" dist="19050" dir="2700000" algn="tl" rotWithShape="0">
-                  <a:schemeClr val="dk1">
-                    <a:alpha val="40000"/>
-                  </a:schemeClr>
-                </a:outerShdw>
-              </a:effectLst>
-            </a:endParaRPr>
-          </a:p>
-        </p:txBody>
-      </p:sp>
-      <p:pic>
-        <p:nvPicPr>
-          <p:cNvPr id="1028" name="Picture 4" descr="Database - Free technology icons"/>
-          <p:cNvPicPr>
-            <a:picLocks noChangeAspect="1" noChangeArrowheads="1"/>
-          </p:cNvPicPr>
-          <p:nvPr/>
-        </p:nvPicPr>
-        <p:blipFill>
-          <a:blip r:embed="rId3" cstate="print">
+              </a:endParaRPr>
+            </a:p>
+          </p:txBody>
+        </p:sp>
+        <p:pic>
+          <p:nvPicPr>
+            <p:cNvPr id="40" name="Picture 2" descr="Person - Free social icons"/>
+            <p:cNvPicPr>
+              <a:picLocks noChangeAspect="1" noChangeArrowheads="1"/>
+            </p:cNvPicPr>
+            <p:nvPr/>
+          </p:nvPicPr>
+          <p:blipFill rotWithShape="1">
+            <a:blip r:embed="rId3" cstate="print">
+              <a:lum bright="70000" contrast="-70000"/>
+              <a:extLst>
+                <a:ext uri="{28A0092B-C50C-407E-A947-70E740481C1C}">
+                  <a14:useLocalDpi xmlns:a14="http://schemas.microsoft.com/office/drawing/2010/main" val="0"/>
+                </a:ext>
+              </a:extLst>
+            </a:blip>
+            <a:srcRect l="16393" t="13662" r="17808" b="16884"/>
+            <a:stretch/>
+          </p:blipFill>
+          <p:spPr bwMode="auto">
+            <a:xfrm>
+              <a:off x="2137819" y="3126638"/>
+              <a:ext cx="706572" cy="745826"/>
+            </a:xfrm>
+            <a:prstGeom prst="rect">
+              <a:avLst/>
+            </a:prstGeom>
+            <a:noFill/>
             <a:extLst>
-              <a:ext uri="{28A0092B-C50C-407E-A947-70E740481C1C}">
-                <a14:useLocalDpi xmlns:a14="http://schemas.microsoft.com/office/drawing/2010/main" val="0"/>
+              <a:ext uri="{909E8E84-426E-40DD-AFC4-6F175D3DCCD1}">
+                <a14:hiddenFill xmlns:a14="http://schemas.microsoft.com/office/drawing/2010/main">
+                  <a:solidFill>
+                    <a:srgbClr val="FFFFFF"/>
+                  </a:solidFill>
+                </a14:hiddenFill>
               </a:ext>
             </a:extLst>
-          </a:blip>
-          <a:srcRect/>
-          <a:stretch>
-            <a:fillRect/>
-          </a:stretch>
-        </p:blipFill>
-        <p:spPr bwMode="auto">
-          <a:xfrm>
-            <a:off x="9051814" y="3022410"/>
-            <a:ext cx="683431" cy="683431"/>
-          </a:xfrm>
-          <a:prstGeom prst="rect">
-            <a:avLst/>
-          </a:prstGeom>
-          <a:noFill/>
-          <a:extLst>
-            <a:ext uri="{909E8E84-426E-40DD-AFC4-6F175D3DCCD1}">
-              <a14:hiddenFill xmlns:a14="http://schemas.microsoft.com/office/drawing/2010/main">
-                <a:solidFill>
-                  <a:srgbClr val="FFFFFF"/>
-                </a:solidFill>
-              </a14:hiddenFill>
-            </a:ext>
-          </a:extLst>
-        </p:spPr>
-      </p:pic>
-      <p:cxnSp>
-        <p:nvCxnSpPr>
-          <p:cNvPr id="38" name="Conector recto de flecha 37"/>
-          <p:cNvCxnSpPr>
-            <a:stCxn id="24" idx="3"/>
-          </p:cNvCxnSpPr>
-          <p:nvPr/>
-        </p:nvCxnSpPr>
-        <p:spPr>
-          <a:xfrm>
-            <a:off x="8578938" y="3364126"/>
-            <a:ext cx="415641" cy="0"/>
-          </a:xfrm>
-          <a:prstGeom prst="straightConnector1">
-            <a:avLst/>
-          </a:prstGeom>
-          <a:ln w="28575">
-            <a:solidFill>
-              <a:schemeClr val="accent6">
-                <a:lumMod val="50000"/>
-              </a:schemeClr>
-            </a:solidFill>
-            <a:headEnd type="triangle"/>
-            <a:tailEnd type="triangle"/>
-          </a:ln>
-        </p:spPr>
-        <p:style>
-          <a:lnRef idx="1">
-            <a:schemeClr val="accent1"/>
-          </a:lnRef>
-          <a:fillRef idx="0">
-            <a:schemeClr val="accent1"/>
-          </a:fillRef>
-          <a:effectRef idx="0">
-            <a:schemeClr val="accent1"/>
-          </a:effectRef>
-          <a:fontRef idx="minor">
-            <a:schemeClr val="tx1"/>
-          </a:fontRef>
-        </p:style>
-      </p:cxnSp>
+          </p:spPr>
+        </p:pic>
+      </p:grpSp>
     </p:spTree>
     <p:extLst>
       <p:ext uri="{BB962C8B-B14F-4D97-AF65-F5344CB8AC3E}">

</xml_diff>